<commit_message>
Se actualiza la vista del usuario.
</commit_message>
<xml_diff>
--- a/otros/Presentación.pptx
+++ b/otros/Presentación.pptx
@@ -107,6 +107,11 @@
       </a:defRPr>
     </a:lvl9pPr>
   </p:defaultTextStyle>
+  <p:extLst>
+    <p:ext uri="{EFAFB233-063F-42B5-8137-9DF3F51BA10A}">
+      <p15:sldGuideLst xmlns:p15="http://schemas.microsoft.com/office/powerpoint/2012/main"/>
+    </p:ext>
+  </p:extLst>
 </p:presentation>
 </file>
 
@@ -259,7 +264,7 @@
           <a:p>
             <a:fld id="{56529BAE-13D2-4F0E-ADAE-196C918E5B7A}" type="datetimeFigureOut">
               <a:rPr lang="es-CO" smtClean="0"/>
-              <a:t>29/10/2020</a:t>
+              <a:t>6/11/2020</a:t>
             </a:fld>
             <a:endParaRPr lang="es-CO"/>
           </a:p>
@@ -459,7 +464,7 @@
           <a:p>
             <a:fld id="{56529BAE-13D2-4F0E-ADAE-196C918E5B7A}" type="datetimeFigureOut">
               <a:rPr lang="es-CO" smtClean="0"/>
-              <a:t>29/10/2020</a:t>
+              <a:t>6/11/2020</a:t>
             </a:fld>
             <a:endParaRPr lang="es-CO"/>
           </a:p>
@@ -669,7 +674,7 @@
           <a:p>
             <a:fld id="{56529BAE-13D2-4F0E-ADAE-196C918E5B7A}" type="datetimeFigureOut">
               <a:rPr lang="es-CO" smtClean="0"/>
-              <a:t>29/10/2020</a:t>
+              <a:t>6/11/2020</a:t>
             </a:fld>
             <a:endParaRPr lang="es-CO"/>
           </a:p>
@@ -869,7 +874,7 @@
           <a:p>
             <a:fld id="{56529BAE-13D2-4F0E-ADAE-196C918E5B7A}" type="datetimeFigureOut">
               <a:rPr lang="es-CO" smtClean="0"/>
-              <a:t>29/10/2020</a:t>
+              <a:t>6/11/2020</a:t>
             </a:fld>
             <a:endParaRPr lang="es-CO"/>
           </a:p>
@@ -1145,7 +1150,7 @@
           <a:p>
             <a:fld id="{56529BAE-13D2-4F0E-ADAE-196C918E5B7A}" type="datetimeFigureOut">
               <a:rPr lang="es-CO" smtClean="0"/>
-              <a:t>29/10/2020</a:t>
+              <a:t>6/11/2020</a:t>
             </a:fld>
             <a:endParaRPr lang="es-CO"/>
           </a:p>
@@ -1413,7 +1418,7 @@
           <a:p>
             <a:fld id="{56529BAE-13D2-4F0E-ADAE-196C918E5B7A}" type="datetimeFigureOut">
               <a:rPr lang="es-CO" smtClean="0"/>
-              <a:t>29/10/2020</a:t>
+              <a:t>6/11/2020</a:t>
             </a:fld>
             <a:endParaRPr lang="es-CO"/>
           </a:p>
@@ -1828,7 +1833,7 @@
           <a:p>
             <a:fld id="{56529BAE-13D2-4F0E-ADAE-196C918E5B7A}" type="datetimeFigureOut">
               <a:rPr lang="es-CO" smtClean="0"/>
-              <a:t>29/10/2020</a:t>
+              <a:t>6/11/2020</a:t>
             </a:fld>
             <a:endParaRPr lang="es-CO"/>
           </a:p>
@@ -1970,7 +1975,7 @@
           <a:p>
             <a:fld id="{56529BAE-13D2-4F0E-ADAE-196C918E5B7A}" type="datetimeFigureOut">
               <a:rPr lang="es-CO" smtClean="0"/>
-              <a:t>29/10/2020</a:t>
+              <a:t>6/11/2020</a:t>
             </a:fld>
             <a:endParaRPr lang="es-CO"/>
           </a:p>
@@ -2083,7 +2088,7 @@
           <a:p>
             <a:fld id="{56529BAE-13D2-4F0E-ADAE-196C918E5B7A}" type="datetimeFigureOut">
               <a:rPr lang="es-CO" smtClean="0"/>
-              <a:t>29/10/2020</a:t>
+              <a:t>6/11/2020</a:t>
             </a:fld>
             <a:endParaRPr lang="es-CO"/>
           </a:p>
@@ -2396,7 +2401,7 @@
           <a:p>
             <a:fld id="{56529BAE-13D2-4F0E-ADAE-196C918E5B7A}" type="datetimeFigureOut">
               <a:rPr lang="es-CO" smtClean="0"/>
-              <a:t>29/10/2020</a:t>
+              <a:t>6/11/2020</a:t>
             </a:fld>
             <a:endParaRPr lang="es-CO"/>
           </a:p>
@@ -2685,7 +2690,7 @@
           <a:p>
             <a:fld id="{56529BAE-13D2-4F0E-ADAE-196C918E5B7A}" type="datetimeFigureOut">
               <a:rPr lang="es-CO" smtClean="0"/>
-              <a:t>29/10/2020</a:t>
+              <a:t>6/11/2020</a:t>
             </a:fld>
             <a:endParaRPr lang="es-CO"/>
           </a:p>
@@ -2928,7 +2933,7 @@
           <a:p>
             <a:fld id="{56529BAE-13D2-4F0E-ADAE-196C918E5B7A}" type="datetimeFigureOut">
               <a:rPr lang="es-CO" smtClean="0"/>
-              <a:t>29/10/2020</a:t>
+              <a:t>6/11/2020</a:t>
             </a:fld>
             <a:endParaRPr lang="es-CO"/>
           </a:p>
@@ -5004,6 +5009,41 @@
           </a:p>
         </p:txBody>
       </p:sp>
+      <p:sp>
+        <p:nvSpPr>
+          <p:cNvPr id="2" name="CuadroTexto 1">
+            <a:extLst>
+              <a:ext uri="{FF2B5EF4-FFF2-40B4-BE49-F238E27FC236}">
+                <a16:creationId xmlns:a16="http://schemas.microsoft.com/office/drawing/2014/main" id="{D5131E2D-30DE-4B5B-A6DB-05C4E07A4DB9}"/>
+              </a:ext>
+            </a:extLst>
+          </p:cNvPr>
+          <p:cNvSpPr txBox="1"/>
+          <p:nvPr/>
+        </p:nvSpPr>
+        <p:spPr>
+          <a:xfrm>
+            <a:off x="8953486" y="2517913"/>
+            <a:ext cx="2271006" cy="369332"/>
+          </a:xfrm>
+          <a:prstGeom prst="rect">
+            <a:avLst/>
+          </a:prstGeom>
+          <a:noFill/>
+        </p:spPr>
+        <p:txBody>
+          <a:bodyPr wrap="none" rtlCol="0">
+            <a:spAutoFit/>
+          </a:bodyPr>
+          <a:lstStyle/>
+          <a:p>
+            <a:r>
+              <a:rPr lang="es-CO" dirty="0"/>
+              <a:t>// Retorna true o false</a:t>
+            </a:r>
+          </a:p>
+        </p:txBody>
+      </p:sp>
     </p:spTree>
     <p:extLst>
       <p:ext uri="{BB962C8B-B14F-4D97-AF65-F5344CB8AC3E}">

</xml_diff>